<commit_message>
Added Games to Presentation
</commit_message>
<xml_diff>
--- a/BestGames.pptx
+++ b/BestGames.pptx
@@ -5,7 +5,11 @@
     <p:sldMasterId id="2147483648" r:id="rId1"/>
   </p:sldMasterIdLst>
   <p:sldIdLst>
-    <p:sldId id="256" r:id="rId2"/>
+    <p:sldId id="257" r:id="rId2"/>
+    <p:sldId id="261" r:id="rId3"/>
+    <p:sldId id="260" r:id="rId4"/>
+    <p:sldId id="259" r:id="rId5"/>
+    <p:sldId id="258" r:id="rId6"/>
   </p:sldIdLst>
   <p:sldSz cx="12192000" cy="6858000"/>
   <p:notesSz cx="6858000" cy="9144000"/>
@@ -104,6 +108,11 @@
       </a:defRPr>
     </a:lvl9pPr>
   </p:defaultTextStyle>
+  <p:extLst>
+    <p:ext uri="{EFAFB233-063F-42B5-8137-9DF3F51BA10A}">
+      <p15:sldGuideLst xmlns:p15="http://schemas.microsoft.com/office/powerpoint/2012/main"/>
+    </p:ext>
+  </p:extLst>
 </p:presentation>
 </file>
 
@@ -3323,58 +3332,269 @@
       </p:grpSpPr>
       <p:sp>
         <p:nvSpPr>
-          <p:cNvPr id="2" name="Title 1">
-            <a:extLst>
-              <a:ext uri="{FF2B5EF4-FFF2-40B4-BE49-F238E27FC236}">
-                <a16:creationId xmlns:a16="http://schemas.microsoft.com/office/drawing/2014/main" id="{72252D49-EEDA-F4A8-F4DD-9F4DAFA26D5B}"/>
-              </a:ext>
-            </a:extLst>
-          </p:cNvPr>
-          <p:cNvSpPr>
-            <a:spLocks noGrp="1"/>
-          </p:cNvSpPr>
-          <p:nvPr>
-            <p:ph type="ctrTitle"/>
-          </p:nvPr>
-        </p:nvSpPr>
-        <p:spPr/>
-        <p:txBody>
-          <a:bodyPr/>
-          <a:lstStyle/>
-          <a:p>
-            <a:endParaRPr lang="en-US"/>
-          </a:p>
-        </p:txBody>
-      </p:sp>
-      <p:sp>
-        <p:nvSpPr>
-          <p:cNvPr id="3" name="Subtitle 2">
-            <a:extLst>
-              <a:ext uri="{FF2B5EF4-FFF2-40B4-BE49-F238E27FC236}">
-                <a16:creationId xmlns:a16="http://schemas.microsoft.com/office/drawing/2014/main" id="{9C8C905A-EFBC-6CAA-E282-8476B537B959}"/>
-              </a:ext>
-            </a:extLst>
-          </p:cNvPr>
-          <p:cNvSpPr>
-            <a:spLocks noGrp="1"/>
-          </p:cNvSpPr>
-          <p:nvPr>
-            <p:ph type="subTitle" idx="1"/>
-          </p:nvPr>
-        </p:nvSpPr>
-        <p:spPr/>
-        <p:txBody>
-          <a:bodyPr/>
-          <a:lstStyle/>
-          <a:p>
-            <a:endParaRPr lang="en-US"/>
+          <p:cNvPr id="4" name="Title 3">
+            <a:extLst>
+              <a:ext uri="{FF2B5EF4-FFF2-40B4-BE49-F238E27FC236}">
+                <a16:creationId xmlns:a16="http://schemas.microsoft.com/office/drawing/2014/main" id="{C67CE5FF-841B-7D9F-EAAA-F34ED9BF77C3}"/>
+              </a:ext>
+            </a:extLst>
+          </p:cNvPr>
+          <p:cNvSpPr>
+            <a:spLocks noGrp="1"/>
+          </p:cNvSpPr>
+          <p:nvPr>
+            <p:ph type="title"/>
+          </p:nvPr>
+        </p:nvSpPr>
+        <p:spPr/>
+        <p:txBody>
+          <a:bodyPr/>
+          <a:lstStyle/>
+          <a:p>
+            <a:r>
+              <a:rPr lang="en-US" dirty="0"/>
+              <a:t>Elden Ring</a:t>
+            </a:r>
           </a:p>
         </p:txBody>
       </p:sp>
     </p:spTree>
     <p:extLst>
       <p:ext uri="{BB962C8B-B14F-4D97-AF65-F5344CB8AC3E}">
-        <p14:creationId xmlns:p14="http://schemas.microsoft.com/office/powerpoint/2010/main" val="3969324952"/>
+        <p14:creationId xmlns:p14="http://schemas.microsoft.com/office/powerpoint/2010/main" val="2991785878"/>
+      </p:ext>
+    </p:extLst>
+  </p:cSld>
+  <p:clrMapOvr>
+    <a:masterClrMapping/>
+  </p:clrMapOvr>
+</p:sld>
+</file>
+
+<file path=ppt/slides/slide2.xml><?xml version="1.0" encoding="utf-8"?>
+<p:sld xmlns:a="http://schemas.openxmlformats.org/drawingml/2006/main" xmlns:r="http://schemas.openxmlformats.org/officeDocument/2006/relationships" xmlns:p="http://schemas.openxmlformats.org/presentationml/2006/main">
+  <p:cSld>
+    <p:spTree>
+      <p:nvGrpSpPr>
+        <p:cNvPr id="1" name=""/>
+        <p:cNvGrpSpPr/>
+        <p:nvPr/>
+      </p:nvGrpSpPr>
+      <p:grpSpPr>
+        <a:xfrm>
+          <a:off x="0" y="0"/>
+          <a:ext cx="0" cy="0"/>
+          <a:chOff x="0" y="0"/>
+          <a:chExt cx="0" cy="0"/>
+        </a:xfrm>
+      </p:grpSpPr>
+      <p:sp>
+        <p:nvSpPr>
+          <p:cNvPr id="4" name="Title 3">
+            <a:extLst>
+              <a:ext uri="{FF2B5EF4-FFF2-40B4-BE49-F238E27FC236}">
+                <a16:creationId xmlns:a16="http://schemas.microsoft.com/office/drawing/2014/main" id="{10D3B3EF-5F80-BB5D-5574-9EC145D0B8BD}"/>
+              </a:ext>
+            </a:extLst>
+          </p:cNvPr>
+          <p:cNvSpPr>
+            <a:spLocks noGrp="1"/>
+          </p:cNvSpPr>
+          <p:nvPr>
+            <p:ph type="title"/>
+          </p:nvPr>
+        </p:nvSpPr>
+        <p:spPr/>
+        <p:txBody>
+          <a:bodyPr/>
+          <a:lstStyle/>
+          <a:p>
+            <a:r>
+              <a:rPr lang="en-US" dirty="0"/>
+              <a:t>Dark Souls 3</a:t>
+            </a:r>
+          </a:p>
+        </p:txBody>
+      </p:sp>
+    </p:spTree>
+    <p:extLst>
+      <p:ext uri="{BB962C8B-B14F-4D97-AF65-F5344CB8AC3E}">
+        <p14:creationId xmlns:p14="http://schemas.microsoft.com/office/powerpoint/2010/main" val="482316571"/>
+      </p:ext>
+    </p:extLst>
+  </p:cSld>
+  <p:clrMapOvr>
+    <a:masterClrMapping/>
+  </p:clrMapOvr>
+</p:sld>
+</file>
+
+<file path=ppt/slides/slide3.xml><?xml version="1.0" encoding="utf-8"?>
+<p:sld xmlns:a="http://schemas.openxmlformats.org/drawingml/2006/main" xmlns:r="http://schemas.openxmlformats.org/officeDocument/2006/relationships" xmlns:p="http://schemas.openxmlformats.org/presentationml/2006/main">
+  <p:cSld>
+    <p:spTree>
+      <p:nvGrpSpPr>
+        <p:cNvPr id="1" name=""/>
+        <p:cNvGrpSpPr/>
+        <p:nvPr/>
+      </p:nvGrpSpPr>
+      <p:grpSpPr>
+        <a:xfrm>
+          <a:off x="0" y="0"/>
+          <a:ext cx="0" cy="0"/>
+          <a:chOff x="0" y="0"/>
+          <a:chExt cx="0" cy="0"/>
+        </a:xfrm>
+      </p:grpSpPr>
+      <p:sp>
+        <p:nvSpPr>
+          <p:cNvPr id="4" name="Title 3">
+            <a:extLst>
+              <a:ext uri="{FF2B5EF4-FFF2-40B4-BE49-F238E27FC236}">
+                <a16:creationId xmlns:a16="http://schemas.microsoft.com/office/drawing/2014/main" id="{29DFD2D6-0BBF-A719-CEE1-BC41F162752F}"/>
+              </a:ext>
+            </a:extLst>
+          </p:cNvPr>
+          <p:cNvSpPr>
+            <a:spLocks noGrp="1"/>
+          </p:cNvSpPr>
+          <p:nvPr>
+            <p:ph type="title"/>
+          </p:nvPr>
+        </p:nvSpPr>
+        <p:spPr/>
+        <p:txBody>
+          <a:bodyPr/>
+          <a:lstStyle/>
+          <a:p>
+            <a:r>
+              <a:rPr lang="en-US" dirty="0"/>
+              <a:t>Red Dead Redemption 2</a:t>
+            </a:r>
+          </a:p>
+        </p:txBody>
+      </p:sp>
+    </p:spTree>
+    <p:extLst>
+      <p:ext uri="{BB962C8B-B14F-4D97-AF65-F5344CB8AC3E}">
+        <p14:creationId xmlns:p14="http://schemas.microsoft.com/office/powerpoint/2010/main" val="3265179390"/>
+      </p:ext>
+    </p:extLst>
+  </p:cSld>
+  <p:clrMapOvr>
+    <a:masterClrMapping/>
+  </p:clrMapOvr>
+</p:sld>
+</file>
+
+<file path=ppt/slides/slide4.xml><?xml version="1.0" encoding="utf-8"?>
+<p:sld xmlns:a="http://schemas.openxmlformats.org/drawingml/2006/main" xmlns:r="http://schemas.openxmlformats.org/officeDocument/2006/relationships" xmlns:p="http://schemas.openxmlformats.org/presentationml/2006/main">
+  <p:cSld>
+    <p:spTree>
+      <p:nvGrpSpPr>
+        <p:cNvPr id="1" name=""/>
+        <p:cNvGrpSpPr/>
+        <p:nvPr/>
+      </p:nvGrpSpPr>
+      <p:grpSpPr>
+        <a:xfrm>
+          <a:off x="0" y="0"/>
+          <a:ext cx="0" cy="0"/>
+          <a:chOff x="0" y="0"/>
+          <a:chExt cx="0" cy="0"/>
+        </a:xfrm>
+      </p:grpSpPr>
+      <p:sp>
+        <p:nvSpPr>
+          <p:cNvPr id="4" name="Title 3">
+            <a:extLst>
+              <a:ext uri="{FF2B5EF4-FFF2-40B4-BE49-F238E27FC236}">
+                <a16:creationId xmlns:a16="http://schemas.microsoft.com/office/drawing/2014/main" id="{09259575-7542-BF42-8702-B3FD466F2B51}"/>
+              </a:ext>
+            </a:extLst>
+          </p:cNvPr>
+          <p:cNvSpPr>
+            <a:spLocks noGrp="1"/>
+          </p:cNvSpPr>
+          <p:nvPr>
+            <p:ph type="title"/>
+          </p:nvPr>
+        </p:nvSpPr>
+        <p:spPr/>
+        <p:txBody>
+          <a:bodyPr/>
+          <a:lstStyle/>
+          <a:p>
+            <a:r>
+              <a:rPr lang="en-US" dirty="0" err="1"/>
+              <a:t>RimWorld</a:t>
+            </a:r>
+            <a:endParaRPr lang="en-US" dirty="0"/>
+          </a:p>
+        </p:txBody>
+      </p:sp>
+    </p:spTree>
+    <p:extLst>
+      <p:ext uri="{BB962C8B-B14F-4D97-AF65-F5344CB8AC3E}">
+        <p14:creationId xmlns:p14="http://schemas.microsoft.com/office/powerpoint/2010/main" val="2695969071"/>
+      </p:ext>
+    </p:extLst>
+  </p:cSld>
+  <p:clrMapOvr>
+    <a:masterClrMapping/>
+  </p:clrMapOvr>
+</p:sld>
+</file>
+
+<file path=ppt/slides/slide5.xml><?xml version="1.0" encoding="utf-8"?>
+<p:sld xmlns:a="http://schemas.openxmlformats.org/drawingml/2006/main" xmlns:r="http://schemas.openxmlformats.org/officeDocument/2006/relationships" xmlns:p="http://schemas.openxmlformats.org/presentationml/2006/main">
+  <p:cSld>
+    <p:spTree>
+      <p:nvGrpSpPr>
+        <p:cNvPr id="1" name=""/>
+        <p:cNvGrpSpPr/>
+        <p:nvPr/>
+      </p:nvGrpSpPr>
+      <p:grpSpPr>
+        <a:xfrm>
+          <a:off x="0" y="0"/>
+          <a:ext cx="0" cy="0"/>
+          <a:chOff x="0" y="0"/>
+          <a:chExt cx="0" cy="0"/>
+        </a:xfrm>
+      </p:grpSpPr>
+      <p:sp>
+        <p:nvSpPr>
+          <p:cNvPr id="4" name="Title 3">
+            <a:extLst>
+              <a:ext uri="{FF2B5EF4-FFF2-40B4-BE49-F238E27FC236}">
+                <a16:creationId xmlns:a16="http://schemas.microsoft.com/office/drawing/2014/main" id="{F5CE4102-7192-7D6F-C8E5-125180704B13}"/>
+              </a:ext>
+            </a:extLst>
+          </p:cNvPr>
+          <p:cNvSpPr>
+            <a:spLocks noGrp="1"/>
+          </p:cNvSpPr>
+          <p:nvPr>
+            <p:ph type="title"/>
+          </p:nvPr>
+        </p:nvSpPr>
+        <p:spPr/>
+        <p:txBody>
+          <a:bodyPr/>
+          <a:lstStyle/>
+          <a:p>
+            <a:r>
+              <a:rPr lang="en-US" dirty="0"/>
+              <a:t>Minecraft</a:t>
+            </a:r>
+          </a:p>
+        </p:txBody>
+      </p:sp>
+    </p:spTree>
+    <p:extLst>
+      <p:ext uri="{BB962C8B-B14F-4D97-AF65-F5344CB8AC3E}">
+        <p14:creationId xmlns:p14="http://schemas.microsoft.com/office/powerpoint/2010/main" val="4209700727"/>
       </p:ext>
     </p:extLst>
   </p:cSld>

</xml_diff>